<commit_message>
remove grid in speculative coverage graph
</commit_message>
<xml_diff>
--- a/7-Draft/wssa-23.pptx
+++ b/7-Draft/wssa-23.pptx
@@ -243,7 +243,7 @@
           <a:p>
             <a:fld id="{318A4400-B34D-9641-ACA4-6F51C2313905}" type="datetimeFigureOut">
               <a:rPr lang="en-US" smtClean="0"/>
-              <a:t>11/7/22</a:t>
+              <a:t>11/18/22</a:t>
             </a:fld>
             <a:endParaRPr lang="en-US"/>
           </a:p>
@@ -413,7 +413,7 @@
           <a:p>
             <a:fld id="{318A4400-B34D-9641-ACA4-6F51C2313905}" type="datetimeFigureOut">
               <a:rPr lang="en-US" smtClean="0"/>
-              <a:t>11/7/22</a:t>
+              <a:t>11/18/22</a:t>
             </a:fld>
             <a:endParaRPr lang="en-US"/>
           </a:p>
@@ -593,7 +593,7 @@
           <a:p>
             <a:fld id="{318A4400-B34D-9641-ACA4-6F51C2313905}" type="datetimeFigureOut">
               <a:rPr lang="en-US" smtClean="0"/>
-              <a:t>11/7/22</a:t>
+              <a:t>11/18/22</a:t>
             </a:fld>
             <a:endParaRPr lang="en-US"/>
           </a:p>
@@ -763,7 +763,7 @@
           <a:p>
             <a:fld id="{318A4400-B34D-9641-ACA4-6F51C2313905}" type="datetimeFigureOut">
               <a:rPr lang="en-US" smtClean="0"/>
-              <a:t>11/7/22</a:t>
+              <a:t>11/18/22</a:t>
             </a:fld>
             <a:endParaRPr lang="en-US"/>
           </a:p>
@@ -1007,7 +1007,7 @@
           <a:p>
             <a:fld id="{318A4400-B34D-9641-ACA4-6F51C2313905}" type="datetimeFigureOut">
               <a:rPr lang="en-US" smtClean="0"/>
-              <a:t>11/7/22</a:t>
+              <a:t>11/18/22</a:t>
             </a:fld>
             <a:endParaRPr lang="en-US"/>
           </a:p>
@@ -1239,7 +1239,7 @@
           <a:p>
             <a:fld id="{318A4400-B34D-9641-ACA4-6F51C2313905}" type="datetimeFigureOut">
               <a:rPr lang="en-US" smtClean="0"/>
-              <a:t>11/7/22</a:t>
+              <a:t>11/18/22</a:t>
             </a:fld>
             <a:endParaRPr lang="en-US"/>
           </a:p>
@@ -1606,7 +1606,7 @@
           <a:p>
             <a:fld id="{318A4400-B34D-9641-ACA4-6F51C2313905}" type="datetimeFigureOut">
               <a:rPr lang="en-US" smtClean="0"/>
-              <a:t>11/7/22</a:t>
+              <a:t>11/18/22</a:t>
             </a:fld>
             <a:endParaRPr lang="en-US"/>
           </a:p>
@@ -1724,7 +1724,7 @@
           <a:p>
             <a:fld id="{318A4400-B34D-9641-ACA4-6F51C2313905}" type="datetimeFigureOut">
               <a:rPr lang="en-US" smtClean="0"/>
-              <a:t>11/7/22</a:t>
+              <a:t>11/18/22</a:t>
             </a:fld>
             <a:endParaRPr lang="en-US"/>
           </a:p>
@@ -1819,7 +1819,7 @@
           <a:p>
             <a:fld id="{318A4400-B34D-9641-ACA4-6F51C2313905}" type="datetimeFigureOut">
               <a:rPr lang="en-US" smtClean="0"/>
-              <a:t>11/7/22</a:t>
+              <a:t>11/18/22</a:t>
             </a:fld>
             <a:endParaRPr lang="en-US"/>
           </a:p>
@@ -2096,7 +2096,7 @@
           <a:p>
             <a:fld id="{318A4400-B34D-9641-ACA4-6F51C2313905}" type="datetimeFigureOut">
               <a:rPr lang="en-US" smtClean="0"/>
-              <a:t>11/7/22</a:t>
+              <a:t>11/18/22</a:t>
             </a:fld>
             <a:endParaRPr lang="en-US"/>
           </a:p>
@@ -2353,7 +2353,7 @@
           <a:p>
             <a:fld id="{318A4400-B34D-9641-ACA4-6F51C2313905}" type="datetimeFigureOut">
               <a:rPr lang="en-US" smtClean="0"/>
-              <a:t>11/7/22</a:t>
+              <a:t>11/18/22</a:t>
             </a:fld>
             <a:endParaRPr lang="en-US"/>
           </a:p>
@@ -2566,7 +2566,7 @@
           <a:p>
             <a:fld id="{318A4400-B34D-9641-ACA4-6F51C2313905}" type="datetimeFigureOut">
               <a:rPr lang="en-US" smtClean="0"/>
-              <a:t>11/7/22</a:t>
+              <a:t>11/18/22</a:t>
             </a:fld>
             <a:endParaRPr lang="en-US"/>
           </a:p>
@@ -3355,7 +3355,7 @@
             <p:spPr>
               <a:xfrm>
                 <a:off x="869388" y="28762731"/>
-                <a:ext cx="26526036" cy="6555641"/>
+                <a:ext cx="26526036" cy="10248960"/>
               </a:xfrm>
               <a:prstGeom prst="rect">
                 <a:avLst/>
@@ -3378,7 +3378,7 @@
                       <a:schemeClr val="tx1"/>
                     </a:solidFill>
                   </a:rPr>
-                  <a:t>Randomized complete block design with 4 replications (N = 48). Each replication consisted of 11 cover crop species and 1 bare soil treatments. Red clover and bare soil are control treatments.</a:t>
+                  <a:t>Randomized complete block design with 4 replications (N = 48). Each replication consisted of 10 brassica cover crop species, 1 red clover, and 1 bare soil treatment. Red clover and bare soil are control treatments.</a:t>
                 </a:r>
               </a:p>
               <a:p>
@@ -3438,7 +3438,7 @@
                       <a:schemeClr val="tx1"/>
                     </a:solidFill>
                   </a:rPr>
-                  <a:t>0.25 </a:t>
+                  <a:t>Crop speculative coverage was evaluated from a 0.25 </a:t>
                 </a:r>
                 <a14:m>
                   <m:oMath xmlns:m="http://schemas.openxmlformats.org/officeDocument/2006/math">
@@ -3484,7 +3484,7 @@
                       <a:schemeClr val="tx1"/>
                     </a:solidFill>
                   </a:rPr>
-                  <a:t> were sampled per plot on Jun 2</a:t>
+                  <a:t> quadrat per plot on Jun 2</a:t>
                 </a:r>
                 <a:r>
                   <a:rPr lang="en-US" sz="6000" baseline="30000" dirty="0">
@@ -3500,7 +3500,7 @@
                       <a:schemeClr val="tx1"/>
                     </a:solidFill>
                   </a:rPr>
-                  <a:t>, 2022, for crop and weed biomass.</a:t>
+                  <a:t>, 2022.</a:t>
                 </a:r>
               </a:p>
               <a:p>
@@ -3514,7 +3514,101 @@
                       <a:schemeClr val="tx1"/>
                     </a:solidFill>
                   </a:rPr>
-                  <a:t>Non-linear model for crop – weed competition was fitted with </a:t>
+                  <a:t>Crop and weed biomass were harvested from a 0.25 </a:t>
+                </a:r>
+                <a14:m>
+                  <m:oMath xmlns:m="http://schemas.openxmlformats.org/officeDocument/2006/math">
+                    <m:sSup>
+                      <m:sSupPr>
+                        <m:ctrlPr>
+                          <a:rPr lang="en-US" sz="6000" i="1">
+                            <a:solidFill>
+                              <a:schemeClr val="tx1"/>
+                            </a:solidFill>
+                            <a:latin typeface="Cambria Math" panose="02040503050406030204" pitchFamily="18" charset="0"/>
+                          </a:rPr>
+                        </m:ctrlPr>
+                      </m:sSupPr>
+                      <m:e>
+                        <m:r>
+                          <a:rPr lang="en-US" sz="6000" i="1">
+                            <a:solidFill>
+                              <a:schemeClr val="tx1"/>
+                            </a:solidFill>
+                            <a:latin typeface="Cambria Math" panose="02040503050406030204" pitchFamily="18" charset="0"/>
+                          </a:rPr>
+                          <m:t>𝑚</m:t>
+                        </m:r>
+                      </m:e>
+                      <m:sup>
+                        <m:r>
+                          <a:rPr lang="en-US" sz="6000" i="1">
+                            <a:solidFill>
+                              <a:schemeClr val="tx1"/>
+                            </a:solidFill>
+                            <a:latin typeface="Cambria Math" panose="02040503050406030204" pitchFamily="18" charset="0"/>
+                          </a:rPr>
+                          <m:t>2</m:t>
+                        </m:r>
+                      </m:sup>
+                    </m:sSup>
+                  </m:oMath>
+                </a14:m>
+                <a:r>
+                  <a:rPr lang="en-US" sz="6000" dirty="0">
+                    <a:solidFill>
+                      <a:schemeClr val="tx1"/>
+                    </a:solidFill>
+                  </a:rPr>
+                  <a:t> quadrat per plot on Jun 3</a:t>
+                </a:r>
+                <a:r>
+                  <a:rPr lang="en-US" sz="6000" baseline="30000" dirty="0">
+                    <a:solidFill>
+                      <a:schemeClr val="tx1"/>
+                    </a:solidFill>
+                  </a:rPr>
+                  <a:t>rd</a:t>
+                </a:r>
+                <a:r>
+                  <a:rPr lang="en-US" sz="6000" dirty="0">
+                    <a:solidFill>
+                      <a:schemeClr val="tx1"/>
+                    </a:solidFill>
+                  </a:rPr>
+                  <a:t>, 2022.</a:t>
+                </a:r>
+              </a:p>
+              <a:p>
+                <a:pPr marL="857250" indent="-857250">
+                  <a:buFont typeface="Arial" panose="020B0604020202020204" pitchFamily="34" charset="0"/>
+                  <a:buChar char="•"/>
+                </a:pPr>
+                <a:r>
+                  <a:rPr lang="en-US" sz="6000" dirty="0"/>
+                  <a:t>Linear model for crop speculative coverage was fitted with </a:t>
+                </a:r>
+                <a:r>
+                  <a:rPr lang="en-US" sz="6000" dirty="0" err="1">
+                    <a:latin typeface="Courier New" panose="02070309020205020404" pitchFamily="49" charset="0"/>
+                    <a:cs typeface="Courier New" panose="02070309020205020404" pitchFamily="49" charset="0"/>
+                  </a:rPr>
+                  <a:t>lm</a:t>
+                </a:r>
+                <a:r>
+                  <a:rPr lang="en-US" sz="6000" dirty="0">
+                    <a:latin typeface="Courier New" panose="02070309020205020404" pitchFamily="49" charset="0"/>
+                    <a:cs typeface="Courier New" panose="02070309020205020404" pitchFamily="49" charset="0"/>
+                  </a:rPr>
+                  <a:t> </a:t>
+                </a:r>
+                <a:r>
+                  <a:rPr lang="en-US" sz="6000" dirty="0">
+                    <a:solidFill>
+                      <a:schemeClr val="tx1"/>
+                    </a:solidFill>
+                  </a:rPr>
+                  <a:t>and non-linear model for crop – weed competition was fitted with </a:t>
                 </a:r>
                 <a:r>
                   <a:rPr lang="en-US" sz="6000" dirty="0" err="1">
@@ -3556,7 +3650,7 @@
             <p:spPr>
               <a:xfrm>
                 <a:off x="869388" y="28762731"/>
-                <a:ext cx="26526036" cy="6555641"/>
+                <a:ext cx="26526036" cy="10248960"/>
               </a:xfrm>
               <a:prstGeom prst="rect">
                 <a:avLst/>
@@ -3564,7 +3658,7 @@
               <a:blipFill>
                 <a:blip r:embed="rId4"/>
                 <a:stretch>
-                  <a:fillRect l="-1292" t="-2703" r="-1340" b="-5212"/>
+                  <a:fillRect l="-1292" t="-1733" r="-1962" b="-3094"/>
                 </a:stretch>
               </a:blipFill>
             </p:spPr>
@@ -3638,8 +3732,8 @@
         </p:nvSpPr>
         <p:spPr>
           <a:xfrm>
-            <a:off x="2730136" y="36775569"/>
-            <a:ext cx="19898215" cy="2862322"/>
+            <a:off x="27810002" y="36195535"/>
+            <a:ext cx="12230099" cy="3785652"/>
           </a:xfrm>
           <a:prstGeom prst="rect">
             <a:avLst/>
@@ -3682,8 +3776,8 @@
           </a:p>
         </p:txBody>
       </p:sp>
-      <mc:AlternateContent xmlns:mc="http://schemas.openxmlformats.org/markup-compatibility/2006">
-        <mc:Choice xmlns:a14="http://schemas.microsoft.com/office/drawing/2010/main" Requires="a14">
+      <mc:AlternateContent xmlns:mc="http://schemas.openxmlformats.org/markup-compatibility/2006" xmlns:a14="http://schemas.microsoft.com/office/drawing/2010/main">
+        <mc:Choice Requires="a14">
           <p:sp>
             <p:nvSpPr>
               <p:cNvPr id="13" name="TextBox 12">
@@ -3839,7 +3933,7 @@
             </p:txBody>
           </p:sp>
         </mc:Choice>
-        <mc:Fallback>
+        <mc:Fallback xmlns="">
           <p:sp>
             <p:nvSpPr>
               <p:cNvPr id="13" name="TextBox 12">
@@ -4185,6 +4279,36 @@
           </a:p>
         </p:txBody>
       </p:sp>
+      <p:pic>
+        <p:nvPicPr>
+          <p:cNvPr id="6" name="Picture 5" descr="Chart&#10;&#10;Description automatically generated">
+            <a:extLst>
+              <a:ext uri="{FF2B5EF4-FFF2-40B4-BE49-F238E27FC236}">
+                <a16:creationId xmlns:a16="http://schemas.microsoft.com/office/drawing/2014/main" id="{E21A3446-F47B-5CFB-8EC3-4C15A31C6235}"/>
+              </a:ext>
+            </a:extLst>
+          </p:cNvPr>
+          <p:cNvPicPr>
+            <a:picLocks noChangeAspect="1"/>
+          </p:cNvPicPr>
+          <p:nvPr/>
+        </p:nvPicPr>
+        <p:blipFill>
+          <a:blip r:embed="rId6"/>
+          <a:stretch>
+            <a:fillRect/>
+          </a:stretch>
+        </p:blipFill>
+        <p:spPr>
+          <a:xfrm>
+            <a:off x="23647616" y="13643336"/>
+            <a:ext cx="8605425" cy="5163255"/>
+          </a:xfrm>
+          <a:prstGeom prst="rect">
+            <a:avLst/>
+          </a:prstGeom>
+        </p:spPr>
+      </p:pic>
     </p:spTree>
     <p:extLst>
       <p:ext uri="{BB962C8B-B14F-4D97-AF65-F5344CB8AC3E}">

</xml_diff>